<commit_message>
revise the fig3 and updated readme
</commit_message>
<xml_diff>
--- a/tutorial/Figs/Plots_ddm_docker_ms.pptx
+++ b/tutorial/Figs/Plots_ddm_docker_ms.pptx
@@ -5316,7 +5316,7 @@
                 <a:cs typeface="Calibri"/>
                 <a:sym typeface="Calibri"/>
               </a:rPr>
-              <a:t>hddm_docker:</a:t>
+              <a:t>hddm:</a:t>
             </a:r>
             <a:r>
               <a:rPr lang="en" sz="1500" dirty="0">
@@ -5650,7 +5650,7 @@
         </p:nvCxnSpPr>
         <p:spPr>
           <a:xfrm flipV="1">
-            <a:off x="3797581" y="3423500"/>
+            <a:off x="3391181" y="3423500"/>
             <a:ext cx="0" cy="1612800"/>
           </a:xfrm>
           <a:prstGeom prst="straightConnector1">
@@ -5678,8 +5678,8 @@
         </p:nvCxnSpPr>
         <p:spPr>
           <a:xfrm>
-            <a:off x="3797584" y="3436938"/>
-            <a:ext cx="1422913" cy="0"/>
+            <a:off x="3391181" y="3423500"/>
+            <a:ext cx="1829316" cy="13438"/>
           </a:xfrm>
           <a:prstGeom prst="straightConnector1">
             <a:avLst/>
@@ -5751,7 +5751,7 @@
         </p:nvCxnSpPr>
         <p:spPr>
           <a:xfrm flipV="1">
-            <a:off x="4638631" y="3906202"/>
+            <a:off x="4089991" y="3906202"/>
             <a:ext cx="0" cy="1134113"/>
           </a:xfrm>
           <a:prstGeom prst="straightConnector1">
@@ -5779,8 +5779,8 @@
         </p:nvCxnSpPr>
         <p:spPr>
           <a:xfrm>
-            <a:off x="4622728" y="3906200"/>
-            <a:ext cx="597769" cy="0"/>
+            <a:off x="4089991" y="3906200"/>
+            <a:ext cx="1130506" cy="0"/>
           </a:xfrm>
           <a:prstGeom prst="straightConnector1">
             <a:avLst/>
@@ -6142,10 +6142,25 @@
                 <a:cs typeface="Calibri"/>
                 <a:sym typeface="Calibri"/>
               </a:rPr>
-              <a:t>-p</a:t>
+              <a:t>-</a:t>
             </a:r>
             <a:r>
-              <a:rPr lang="en" sz="1500" dirty="0">
+              <a:rPr lang="en" sz="1500">
+                <a:solidFill>
+                  <a:schemeClr val="dk1"/>
+                </a:solidFill>
+                <a:highlight>
+                  <a:srgbClr val="A2C4C9"/>
+                </a:highlight>
+                <a:latin typeface="Calibri"/>
+                <a:ea typeface="Calibri"/>
+                <a:cs typeface="Calibri"/>
+                <a:sym typeface="Calibri"/>
+              </a:rPr>
+              <a:t>p</a:t>
+            </a:r>
+            <a:r>
+              <a:rPr lang="en" sz="1500">
                 <a:solidFill>
                   <a:schemeClr val="dk1"/>
                 </a:solidFill>
@@ -6157,7 +6172,7 @@
               <a:t> </a:t>
             </a:r>
             <a:r>
-              <a:rPr lang="en" sz="1500" dirty="0">
+              <a:rPr lang="en" sz="1500">
                 <a:solidFill>
                   <a:schemeClr val="dk1"/>
                 </a:solidFill>
@@ -6169,10 +6184,10 @@
                 <a:cs typeface="Calibri"/>
                 <a:sym typeface="Calibri"/>
               </a:rPr>
-              <a:t>8989:8888</a:t>
+              <a:t>8888:8888</a:t>
             </a:r>
             <a:r>
-              <a:rPr lang="en" sz="1500" dirty="0">
+              <a:rPr lang="en" sz="1500">
                 <a:solidFill>
                   <a:schemeClr val="dk1"/>
                 </a:solidFill>

</xml_diff>

<commit_message>
add upgrade to docker file
</commit_message>
<xml_diff>
--- a/tutorial/Figs/Plots_ddm_docker_ms.pptx
+++ b/tutorial/Figs/Plots_ddm_docker_ms.pptx
@@ -6039,7 +6039,7 @@
               <a:t>jovyan</a:t>
             </a:r>
             <a:r>
-              <a:rPr lang="en" sz="1500" dirty="0">
+              <a:rPr lang="en" sz="1500">
                 <a:solidFill>
                   <a:schemeClr val="dk1"/>
                 </a:solidFill>
@@ -6051,25 +6051,10 @@
                 <a:cs typeface="Calibri"/>
                 <a:sym typeface="Calibri"/>
               </a:rPr>
-              <a:t>/</a:t>
+              <a:t>/work</a:t>
             </a:r>
             <a:r>
-              <a:rPr lang="en" sz="1500" dirty="0" err="1">
-                <a:solidFill>
-                  <a:schemeClr val="dk1"/>
-                </a:solidFill>
-                <a:highlight>
-                  <a:srgbClr val="FFE599"/>
-                </a:highlight>
-                <a:latin typeface="Calibri"/>
-                <a:ea typeface="Calibri"/>
-                <a:cs typeface="Calibri"/>
-                <a:sym typeface="Calibri"/>
-              </a:rPr>
-              <a:t>hddm</a:t>
-            </a:r>
-            <a:r>
-              <a:rPr lang="en" sz="1500" dirty="0">
+              <a:rPr lang="en" sz="1500">
                 <a:solidFill>
                   <a:schemeClr val="dk1"/>
                 </a:solidFill>
@@ -6142,25 +6127,10 @@
                 <a:cs typeface="Calibri"/>
                 <a:sym typeface="Calibri"/>
               </a:rPr>
-              <a:t>-</a:t>
+              <a:t>-p</a:t>
             </a:r>
             <a:r>
-              <a:rPr lang="en" sz="1500">
-                <a:solidFill>
-                  <a:schemeClr val="dk1"/>
-                </a:solidFill>
-                <a:highlight>
-                  <a:srgbClr val="A2C4C9"/>
-                </a:highlight>
-                <a:latin typeface="Calibri"/>
-                <a:ea typeface="Calibri"/>
-                <a:cs typeface="Calibri"/>
-                <a:sym typeface="Calibri"/>
-              </a:rPr>
-              <a:t>p</a:t>
-            </a:r>
-            <a:r>
-              <a:rPr lang="en" sz="1500">
+              <a:rPr lang="en" sz="1500" dirty="0">
                 <a:solidFill>
                   <a:schemeClr val="dk1"/>
                 </a:solidFill>
@@ -6172,7 +6142,7 @@
               <a:t> </a:t>
             </a:r>
             <a:r>
-              <a:rPr lang="en" sz="1500">
+              <a:rPr lang="en" sz="1500" dirty="0">
                 <a:solidFill>
                   <a:schemeClr val="dk1"/>
                 </a:solidFill>
@@ -6187,7 +6157,7 @@
               <a:t>8888:8888</a:t>
             </a:r>
             <a:r>
-              <a:rPr lang="en" sz="1500">
+              <a:rPr lang="en" sz="1500" dirty="0">
                 <a:solidFill>
                   <a:schemeClr val="dk1"/>
                 </a:solidFill>

</xml_diff>

<commit_message>
add dockerfile for m1 chips
</commit_message>
<xml_diff>
--- a/tutorial/Figs/Plots_ddm_docker_ms.pptx
+++ b/tutorial/Figs/Plots_ddm_docker_ms.pptx
@@ -6039,7 +6039,7 @@
               <a:t>jovyan</a:t>
             </a:r>
             <a:r>
-              <a:rPr lang="en" sz="1500" dirty="0">
+              <a:rPr lang="en" sz="1500">
                 <a:solidFill>
                   <a:schemeClr val="dk1"/>
                 </a:solidFill>
@@ -6051,25 +6051,10 @@
                 <a:cs typeface="Calibri"/>
                 <a:sym typeface="Calibri"/>
               </a:rPr>
-              <a:t>/</a:t>
+              <a:t>/work</a:t>
             </a:r>
             <a:r>
-              <a:rPr lang="en" sz="1500" dirty="0" err="1">
-                <a:solidFill>
-                  <a:schemeClr val="dk1"/>
-                </a:solidFill>
-                <a:highlight>
-                  <a:srgbClr val="FFE599"/>
-                </a:highlight>
-                <a:latin typeface="Calibri"/>
-                <a:ea typeface="Calibri"/>
-                <a:cs typeface="Calibri"/>
-                <a:sym typeface="Calibri"/>
-              </a:rPr>
-              <a:t>hddm</a:t>
-            </a:r>
-            <a:r>
-              <a:rPr lang="en" sz="1500" dirty="0">
+              <a:rPr lang="en" sz="1500">
                 <a:solidFill>
                   <a:schemeClr val="dk1"/>
                 </a:solidFill>
@@ -6142,25 +6127,10 @@
                 <a:cs typeface="Calibri"/>
                 <a:sym typeface="Calibri"/>
               </a:rPr>
-              <a:t>-</a:t>
+              <a:t>-p</a:t>
             </a:r>
             <a:r>
-              <a:rPr lang="en" sz="1500">
-                <a:solidFill>
-                  <a:schemeClr val="dk1"/>
-                </a:solidFill>
-                <a:highlight>
-                  <a:srgbClr val="A2C4C9"/>
-                </a:highlight>
-                <a:latin typeface="Calibri"/>
-                <a:ea typeface="Calibri"/>
-                <a:cs typeface="Calibri"/>
-                <a:sym typeface="Calibri"/>
-              </a:rPr>
-              <a:t>p</a:t>
-            </a:r>
-            <a:r>
-              <a:rPr lang="en" sz="1500">
+              <a:rPr lang="en" sz="1500" dirty="0">
                 <a:solidFill>
                   <a:schemeClr val="dk1"/>
                 </a:solidFill>
@@ -6172,7 +6142,7 @@
               <a:t> </a:t>
             </a:r>
             <a:r>
-              <a:rPr lang="en" sz="1500">
+              <a:rPr lang="en" sz="1500" dirty="0">
                 <a:solidFill>
                   <a:schemeClr val="dk1"/>
                 </a:solidFill>
@@ -6187,7 +6157,7 @@
               <a:t>8888:8888</a:t>
             </a:r>
             <a:r>
-              <a:rPr lang="en" sz="1500">
+              <a:rPr lang="en" sz="1500" dirty="0">
                 <a:solidFill>
                   <a:schemeClr val="dk1"/>
                 </a:solidFill>

</xml_diff>